<commit_message>
reevaluate avg pace not qualified record by detail records
</commit_message>
<xml_diff>
--- a/misc/data-flow-chart.pptx
+++ b/misc/data-flow-chart.pptx
@@ -288,7 +288,8 @@
           <a:p>
             <a:fld id="{6BE6A19C-AC0D-4809-B7AA-E03640B20A3A}" type="datetimeFigureOut">
               <a:rPr lang="zh-CN" altLang="en-US" smtClean="0"/>
-              <a:t>2019/1/23</a:t>
+              <a:pPr/>
+              <a:t>2019/5/7</a:t>
             </a:fld>
             <a:endParaRPr lang="zh-CN" altLang="en-US"/>
           </a:p>
@@ -330,6 +331,7 @@
           <a:p>
             <a:fld id="{46393A69-2EE3-40E3-A239-FC8592289694}" type="slidenum">
               <a:rPr lang="zh-CN" altLang="en-US" smtClean="0"/>
+              <a:pPr/>
               <a:t>‹#›</a:t>
             </a:fld>
             <a:endParaRPr lang="zh-CN" altLang="en-US"/>
@@ -453,7 +455,8 @@
           <a:p>
             <a:fld id="{6BE6A19C-AC0D-4809-B7AA-E03640B20A3A}" type="datetimeFigureOut">
               <a:rPr lang="zh-CN" altLang="en-US" smtClean="0"/>
-              <a:t>2019/1/23</a:t>
+              <a:pPr/>
+              <a:t>2019/5/7</a:t>
             </a:fld>
             <a:endParaRPr lang="zh-CN" altLang="en-US"/>
           </a:p>
@@ -495,6 +498,7 @@
           <a:p>
             <a:fld id="{46393A69-2EE3-40E3-A239-FC8592289694}" type="slidenum">
               <a:rPr lang="zh-CN" altLang="en-US" smtClean="0"/>
+              <a:pPr/>
               <a:t>‹#›</a:t>
             </a:fld>
             <a:endParaRPr lang="zh-CN" altLang="en-US"/>
@@ -628,7 +632,8 @@
           <a:p>
             <a:fld id="{6BE6A19C-AC0D-4809-B7AA-E03640B20A3A}" type="datetimeFigureOut">
               <a:rPr lang="zh-CN" altLang="en-US" smtClean="0"/>
-              <a:t>2019/1/23</a:t>
+              <a:pPr/>
+              <a:t>2019/5/7</a:t>
             </a:fld>
             <a:endParaRPr lang="zh-CN" altLang="en-US"/>
           </a:p>
@@ -670,6 +675,7 @@
           <a:p>
             <a:fld id="{46393A69-2EE3-40E3-A239-FC8592289694}" type="slidenum">
               <a:rPr lang="zh-CN" altLang="en-US" smtClean="0"/>
+              <a:pPr/>
               <a:t>‹#›</a:t>
             </a:fld>
             <a:endParaRPr lang="zh-CN" altLang="en-US"/>
@@ -793,7 +799,8 @@
           <a:p>
             <a:fld id="{6BE6A19C-AC0D-4809-B7AA-E03640B20A3A}" type="datetimeFigureOut">
               <a:rPr lang="zh-CN" altLang="en-US" smtClean="0"/>
-              <a:t>2019/1/23</a:t>
+              <a:pPr/>
+              <a:t>2019/5/7</a:t>
             </a:fld>
             <a:endParaRPr lang="zh-CN" altLang="en-US"/>
           </a:p>
@@ -835,6 +842,7 @@
           <a:p>
             <a:fld id="{46393A69-2EE3-40E3-A239-FC8592289694}" type="slidenum">
               <a:rPr lang="zh-CN" altLang="en-US" smtClean="0"/>
+              <a:pPr/>
               <a:t>‹#›</a:t>
             </a:fld>
             <a:endParaRPr lang="zh-CN" altLang="en-US"/>
@@ -1034,7 +1042,8 @@
           <a:p>
             <a:fld id="{6BE6A19C-AC0D-4809-B7AA-E03640B20A3A}" type="datetimeFigureOut">
               <a:rPr lang="zh-CN" altLang="en-US" smtClean="0"/>
-              <a:t>2019/1/23</a:t>
+              <a:pPr/>
+              <a:t>2019/5/7</a:t>
             </a:fld>
             <a:endParaRPr lang="zh-CN" altLang="en-US"/>
           </a:p>
@@ -1076,6 +1085,7 @@
           <a:p>
             <a:fld id="{46393A69-2EE3-40E3-A239-FC8592289694}" type="slidenum">
               <a:rPr lang="zh-CN" altLang="en-US" smtClean="0"/>
+              <a:pPr/>
               <a:t>‹#›</a:t>
             </a:fld>
             <a:endParaRPr lang="zh-CN" altLang="en-US"/>
@@ -1317,7 +1327,8 @@
           <a:p>
             <a:fld id="{6BE6A19C-AC0D-4809-B7AA-E03640B20A3A}" type="datetimeFigureOut">
               <a:rPr lang="zh-CN" altLang="en-US" smtClean="0"/>
-              <a:t>2019/1/23</a:t>
+              <a:pPr/>
+              <a:t>2019/5/7</a:t>
             </a:fld>
             <a:endParaRPr lang="zh-CN" altLang="en-US"/>
           </a:p>
@@ -1359,6 +1370,7 @@
           <a:p>
             <a:fld id="{46393A69-2EE3-40E3-A239-FC8592289694}" type="slidenum">
               <a:rPr lang="zh-CN" altLang="en-US" smtClean="0"/>
+              <a:pPr/>
               <a:t>‹#›</a:t>
             </a:fld>
             <a:endParaRPr lang="zh-CN" altLang="en-US"/>
@@ -1734,7 +1746,8 @@
           <a:p>
             <a:fld id="{6BE6A19C-AC0D-4809-B7AA-E03640B20A3A}" type="datetimeFigureOut">
               <a:rPr lang="zh-CN" altLang="en-US" smtClean="0"/>
-              <a:t>2019/1/23</a:t>
+              <a:pPr/>
+              <a:t>2019/5/7</a:t>
             </a:fld>
             <a:endParaRPr lang="zh-CN" altLang="en-US"/>
           </a:p>
@@ -1776,6 +1789,7 @@
           <a:p>
             <a:fld id="{46393A69-2EE3-40E3-A239-FC8592289694}" type="slidenum">
               <a:rPr lang="zh-CN" altLang="en-US" smtClean="0"/>
+              <a:pPr/>
               <a:t>‹#›</a:t>
             </a:fld>
             <a:endParaRPr lang="zh-CN" altLang="en-US"/>
@@ -1847,7 +1861,8 @@
           <a:p>
             <a:fld id="{6BE6A19C-AC0D-4809-B7AA-E03640B20A3A}" type="datetimeFigureOut">
               <a:rPr lang="zh-CN" altLang="en-US" smtClean="0"/>
-              <a:t>2019/1/23</a:t>
+              <a:pPr/>
+              <a:t>2019/5/7</a:t>
             </a:fld>
             <a:endParaRPr lang="zh-CN" altLang="en-US"/>
           </a:p>
@@ -1889,6 +1904,7 @@
           <a:p>
             <a:fld id="{46393A69-2EE3-40E3-A239-FC8592289694}" type="slidenum">
               <a:rPr lang="zh-CN" altLang="en-US" smtClean="0"/>
+              <a:pPr/>
               <a:t>‹#›</a:t>
             </a:fld>
             <a:endParaRPr lang="zh-CN" altLang="en-US"/>
@@ -1937,7 +1953,8 @@
           <a:p>
             <a:fld id="{6BE6A19C-AC0D-4809-B7AA-E03640B20A3A}" type="datetimeFigureOut">
               <a:rPr lang="zh-CN" altLang="en-US" smtClean="0"/>
-              <a:t>2019/1/23</a:t>
+              <a:pPr/>
+              <a:t>2019/5/7</a:t>
             </a:fld>
             <a:endParaRPr lang="zh-CN" altLang="en-US"/>
           </a:p>
@@ -1979,6 +1996,7 @@
           <a:p>
             <a:fld id="{46393A69-2EE3-40E3-A239-FC8592289694}" type="slidenum">
               <a:rPr lang="zh-CN" altLang="en-US" smtClean="0"/>
+              <a:pPr/>
               <a:t>‹#›</a:t>
             </a:fld>
             <a:endParaRPr lang="zh-CN" altLang="en-US"/>
@@ -2209,7 +2227,8 @@
           <a:p>
             <a:fld id="{6BE6A19C-AC0D-4809-B7AA-E03640B20A3A}" type="datetimeFigureOut">
               <a:rPr lang="zh-CN" altLang="en-US" smtClean="0"/>
-              <a:t>2019/1/23</a:t>
+              <a:pPr/>
+              <a:t>2019/5/7</a:t>
             </a:fld>
             <a:endParaRPr lang="zh-CN" altLang="en-US"/>
           </a:p>
@@ -2251,6 +2270,7 @@
           <a:p>
             <a:fld id="{46393A69-2EE3-40E3-A239-FC8592289694}" type="slidenum">
               <a:rPr lang="zh-CN" altLang="en-US" smtClean="0"/>
+              <a:pPr/>
               <a:t>‹#›</a:t>
             </a:fld>
             <a:endParaRPr lang="zh-CN" altLang="en-US"/>
@@ -2457,7 +2477,8 @@
           <a:p>
             <a:fld id="{6BE6A19C-AC0D-4809-B7AA-E03640B20A3A}" type="datetimeFigureOut">
               <a:rPr lang="zh-CN" altLang="en-US" smtClean="0"/>
-              <a:t>2019/1/23</a:t>
+              <a:pPr/>
+              <a:t>2019/5/7</a:t>
             </a:fld>
             <a:endParaRPr lang="zh-CN" altLang="en-US"/>
           </a:p>
@@ -2499,6 +2520,7 @@
           <a:p>
             <a:fld id="{46393A69-2EE3-40E3-A239-FC8592289694}" type="slidenum">
               <a:rPr lang="zh-CN" altLang="en-US" smtClean="0"/>
+              <a:pPr/>
               <a:t>‹#›</a:t>
             </a:fld>
             <a:endParaRPr lang="zh-CN" altLang="en-US"/>
@@ -2665,7 +2687,8 @@
           <a:p>
             <a:fld id="{6BE6A19C-AC0D-4809-B7AA-E03640B20A3A}" type="datetimeFigureOut">
               <a:rPr lang="zh-CN" altLang="en-US" smtClean="0"/>
-              <a:t>2019/1/23</a:t>
+              <a:pPr/>
+              <a:t>2019/5/7</a:t>
             </a:fld>
             <a:endParaRPr lang="zh-CN" altLang="en-US"/>
           </a:p>
@@ -2743,6 +2766,7 @@
           <a:p>
             <a:fld id="{46393A69-2EE3-40E3-A239-FC8592289694}" type="slidenum">
               <a:rPr lang="zh-CN" altLang="en-US" smtClean="0"/>
+              <a:pPr/>
               <a:t>‹#›</a:t>
             </a:fld>
             <a:endParaRPr lang="zh-CN" altLang="en-US"/>
@@ -3450,7 +3474,35 @@
                 <a:latin typeface="微软雅黑" pitchFamily="34" charset="-122"/>
                 <a:ea typeface="微软雅黑" pitchFamily="34" charset="-122"/>
               </a:rPr>
-              <a:t>中出现过的记录</a:t>
+              <a:t>中出现过的</a:t>
+            </a:r>
+            <a:r>
+              <a:rPr lang="zh-CN" altLang="en-US" sz="900" dirty="0" smtClean="0">
+                <a:latin typeface="微软雅黑" pitchFamily="34" charset="-122"/>
+                <a:ea typeface="微软雅黑" pitchFamily="34" charset="-122"/>
+              </a:rPr>
+              <a:t>记录</a:t>
+            </a:r>
+            <a:r>
+              <a:rPr lang="zh-CN" altLang="en-US" sz="900" dirty="0" smtClean="0">
+                <a:latin typeface="微软雅黑" pitchFamily="34" charset="-122"/>
+                <a:ea typeface="微软雅黑" pitchFamily="34" charset="-122"/>
+              </a:rPr>
+              <a:t>（中途转分队</a:t>
+            </a:r>
+            <a:r>
+              <a:rPr lang="zh-CN" altLang="en-US" sz="900" dirty="0" smtClean="0">
+                <a:latin typeface="微软雅黑" pitchFamily="34" charset="-122"/>
+                <a:ea typeface="微软雅黑" pitchFamily="34" charset="-122"/>
+              </a:rPr>
+              <a:t>导致</a:t>
+            </a:r>
+            <a:r>
+              <a:rPr lang="zh-CN" altLang="en-US" sz="900" dirty="0" smtClean="0">
+                <a:latin typeface="微软雅黑" pitchFamily="34" charset="-122"/>
+                <a:ea typeface="微软雅黑" pitchFamily="34" charset="-122"/>
+              </a:rPr>
+              <a:t>）</a:t>
             </a:r>
             <a:endParaRPr lang="zh-CN" altLang="en-US" sz="900" dirty="0">
               <a:latin typeface="微软雅黑" pitchFamily="34" charset="-122"/>
@@ -6637,14 +6689,7 @@
                 <a:latin typeface="微软雅黑" pitchFamily="34" charset="-122"/>
                 <a:ea typeface="微软雅黑" pitchFamily="34" charset="-122"/>
               </a:rPr>
-              <a:t>本周</a:t>
-            </a:r>
-            <a:r>
-              <a:rPr lang="zh-CN" altLang="en-US" sz="900" dirty="0" smtClean="0">
-                <a:latin typeface="微软雅黑" pitchFamily="34" charset="-122"/>
-                <a:ea typeface="微软雅黑" pitchFamily="34" charset="-122"/>
-              </a:rPr>
-              <a:t>所有成员</a:t>
+              <a:t>本周所有成员</a:t>
             </a:r>
             <a:endParaRPr lang="zh-CN" altLang="en-US" sz="900" dirty="0">
               <a:latin typeface="微软雅黑" pitchFamily="34" charset="-122"/>

</xml_diff>